<commit_message>
Added Firebase Database presentation slides.
</commit_message>
<xml_diff>
--- a/Project_Files/Sprint 6/FreeBies For NewBies (2).pptx
+++ b/Project_Files/Sprint 6/FreeBies For NewBies (2).pptx
@@ -5,10 +5,10 @@
     <p:sldMasterId id="2147483720" r:id="rId1"/>
   </p:sldMasterIdLst>
   <p:notesMasterIdLst>
-    <p:notesMasterId r:id="rId30"/>
+    <p:notesMasterId r:id="rId34"/>
   </p:notesMasterIdLst>
   <p:handoutMasterIdLst>
-    <p:handoutMasterId r:id="rId31"/>
+    <p:handoutMasterId r:id="rId35"/>
   </p:handoutMasterIdLst>
   <p:sldIdLst>
     <p:sldId id="256" r:id="rId2"/>
@@ -39,6 +39,10 @@
     <p:sldId id="273" r:id="rId27"/>
     <p:sldId id="274" r:id="rId28"/>
     <p:sldId id="275" r:id="rId29"/>
+    <p:sldId id="290" r:id="rId30"/>
+    <p:sldId id="291" r:id="rId31"/>
+    <p:sldId id="292" r:id="rId32"/>
+    <p:sldId id="293" r:id="rId33"/>
   </p:sldIdLst>
   <p:sldSz cx="12192000" cy="6858000"/>
   <p:notesSz cx="6858000" cy="9144000"/>
@@ -25952,6 +25956,307 @@
 </p:sld>
 </file>
 
+<file path=ppt/slides/slide29.xml><?xml version="1.0" encoding="utf-8"?>
+<p:sld xmlns:a="http://schemas.openxmlformats.org/drawingml/2006/main" xmlns:r="http://schemas.openxmlformats.org/officeDocument/2006/relationships" xmlns:p="http://schemas.openxmlformats.org/presentationml/2006/main">
+  <p:cSld>
+    <p:spTree>
+      <p:nvGrpSpPr>
+        <p:cNvPr id="1" name=""/>
+        <p:cNvGrpSpPr/>
+        <p:nvPr/>
+      </p:nvGrpSpPr>
+      <p:grpSpPr>
+        <a:xfrm>
+          <a:off x="0" y="0"/>
+          <a:ext cx="0" cy="0"/>
+          <a:chOff x="0" y="0"/>
+          <a:chExt cx="0" cy="0"/>
+        </a:xfrm>
+      </p:grpSpPr>
+      <p:sp>
+        <p:nvSpPr>
+          <p:cNvPr id="2" name="Title 1">
+            <a:extLst>
+              <a:ext uri="{FF2B5EF4-FFF2-40B4-BE49-F238E27FC236}">
+                <a16:creationId xmlns:a16="http://schemas.microsoft.com/office/drawing/2014/main" id="{E5E09142-95B2-1495-2547-D44E215C7357}"/>
+              </a:ext>
+            </a:extLst>
+          </p:cNvPr>
+          <p:cNvSpPr>
+            <a:spLocks noGrp="1"/>
+          </p:cNvSpPr>
+          <p:nvPr>
+            <p:ph type="title"/>
+          </p:nvPr>
+        </p:nvSpPr>
+        <p:spPr/>
+        <p:txBody>
+          <a:bodyPr/>
+          <a:lstStyle/>
+          <a:p>
+            <a:r>
+              <a:rPr lang="en-US" dirty="0">
+                <a:latin typeface="Times New Roman" panose="02020603050405020304" pitchFamily="18" charset="0"/>
+                <a:cs typeface="Times New Roman" panose="02020603050405020304" pitchFamily="18" charset="0"/>
+              </a:rPr>
+              <a:t>Firebase Database  </a:t>
+            </a:r>
+          </a:p>
+        </p:txBody>
+      </p:sp>
+      <p:sp>
+        <p:nvSpPr>
+          <p:cNvPr id="3" name="Content Placeholder 2">
+            <a:extLst>
+              <a:ext uri="{FF2B5EF4-FFF2-40B4-BE49-F238E27FC236}">
+                <a16:creationId xmlns:a16="http://schemas.microsoft.com/office/drawing/2014/main" id="{3F7DEFD3-5B11-A5DC-013F-4B2965E965B3}"/>
+              </a:ext>
+            </a:extLst>
+          </p:cNvPr>
+          <p:cNvSpPr>
+            <a:spLocks noGrp="1"/>
+          </p:cNvSpPr>
+          <p:nvPr>
+            <p:ph idx="1"/>
+          </p:nvPr>
+        </p:nvSpPr>
+        <p:spPr/>
+        <p:txBody>
+          <a:bodyPr>
+            <a:normAutofit fontScale="92500" lnSpcReduction="20000"/>
+          </a:bodyPr>
+          <a:lstStyle/>
+          <a:p>
+            <a:r>
+              <a:rPr lang="en-US" sz="1900" dirty="0">
+                <a:latin typeface="Times New Roman" panose="02020603050405020304" pitchFamily="18" charset="0"/>
+                <a:cs typeface="Times New Roman" panose="02020603050405020304" pitchFamily="18" charset="0"/>
+              </a:rPr>
+              <a:t>Firebase is a mobile and web application development platform developed by Firebase, Inc.in 2011, then acquired by google in 2014.</a:t>
+            </a:r>
+          </a:p>
+          <a:p>
+            <a:r>
+              <a:rPr lang="en-US" sz="1900" dirty="0">
+                <a:latin typeface="Times New Roman" panose="02020603050405020304" pitchFamily="18" charset="0"/>
+                <a:cs typeface="Times New Roman" panose="02020603050405020304" pitchFamily="18" charset="0"/>
+              </a:rPr>
+              <a:t>Firebase has supported for the web, IOS, android.</a:t>
+            </a:r>
+          </a:p>
+          <a:p>
+            <a:r>
+              <a:rPr lang="en-US" sz="1900" dirty="0">
+                <a:latin typeface="Times New Roman" panose="02020603050405020304" pitchFamily="18" charset="0"/>
+                <a:cs typeface="Times New Roman" panose="02020603050405020304" pitchFamily="18" charset="0"/>
+              </a:rPr>
+              <a:t>Firebase automatically generate Server-side code. It is for anybody that wants to write apps without having to run backend server or write server code.</a:t>
+            </a:r>
+          </a:p>
+          <a:p>
+            <a:r>
+              <a:rPr lang="en-US" sz="1900" b="1" dirty="0">
+                <a:latin typeface="Times New Roman" panose="02020603050405020304" pitchFamily="18" charset="0"/>
+                <a:cs typeface="Times New Roman" panose="02020603050405020304" pitchFamily="18" charset="0"/>
+              </a:rPr>
+              <a:t>Features :</a:t>
+            </a:r>
+          </a:p>
+          <a:p>
+            <a:pPr marL="0" indent="0">
+              <a:buNone/>
+            </a:pPr>
+            <a:r>
+              <a:rPr lang="en-US" sz="1900" dirty="0">
+                <a:latin typeface="Times New Roman" panose="02020603050405020304" pitchFamily="18" charset="0"/>
+                <a:cs typeface="Times New Roman" panose="02020603050405020304" pitchFamily="18" charset="0"/>
+              </a:rPr>
+              <a:t>                   1. Authentication</a:t>
+            </a:r>
+          </a:p>
+          <a:p>
+            <a:pPr marL="0" indent="0">
+              <a:buNone/>
+            </a:pPr>
+            <a:r>
+              <a:rPr lang="en-US" sz="1900" dirty="0">
+                <a:latin typeface="Times New Roman" panose="02020603050405020304" pitchFamily="18" charset="0"/>
+                <a:cs typeface="Times New Roman" panose="02020603050405020304" pitchFamily="18" charset="0"/>
+              </a:rPr>
+              <a:t>                   2. Database</a:t>
+            </a:r>
+          </a:p>
+          <a:p>
+            <a:pPr marL="0" indent="0">
+              <a:buNone/>
+            </a:pPr>
+            <a:r>
+              <a:rPr lang="en-US" sz="1900" dirty="0">
+                <a:latin typeface="Times New Roman" panose="02020603050405020304" pitchFamily="18" charset="0"/>
+                <a:cs typeface="Times New Roman" panose="02020603050405020304" pitchFamily="18" charset="0"/>
+              </a:rPr>
+              <a:t>                   3. Storage</a:t>
+            </a:r>
+          </a:p>
+          <a:p>
+            <a:pPr marL="0" indent="0">
+              <a:buNone/>
+            </a:pPr>
+            <a:r>
+              <a:rPr lang="en-US" sz="1900" dirty="0">
+                <a:latin typeface="Times New Roman" panose="02020603050405020304" pitchFamily="18" charset="0"/>
+                <a:cs typeface="Times New Roman" panose="02020603050405020304" pitchFamily="18" charset="0"/>
+              </a:rPr>
+              <a:t>                   4.Hosting</a:t>
+            </a:r>
+          </a:p>
+          <a:p>
+            <a:pPr marL="0" indent="0">
+              <a:buNone/>
+            </a:pPr>
+            <a:r>
+              <a:rPr lang="en-US" sz="1900" dirty="0">
+                <a:latin typeface="Times New Roman" panose="02020603050405020304" pitchFamily="18" charset="0"/>
+                <a:cs typeface="Times New Roman" panose="02020603050405020304" pitchFamily="18" charset="0"/>
+              </a:rPr>
+              <a:t>                   5.Cloud messaging</a:t>
+            </a:r>
+          </a:p>
+          <a:p>
+            <a:pPr marL="0" indent="0">
+              <a:buNone/>
+            </a:pPr>
+            <a:r>
+              <a:rPr lang="en-US" dirty="0"/>
+              <a:t>     </a:t>
+            </a:r>
+          </a:p>
+          <a:p>
+            <a:endParaRPr lang="en-US" dirty="0"/>
+          </a:p>
+          <a:p>
+            <a:endParaRPr lang="en-US" dirty="0"/>
+          </a:p>
+        </p:txBody>
+      </p:sp>
+      <p:pic>
+        <p:nvPicPr>
+          <p:cNvPr id="1026" name="Picture 2" descr="See the source image">
+            <a:extLst>
+              <a:ext uri="{FF2B5EF4-FFF2-40B4-BE49-F238E27FC236}">
+                <a16:creationId xmlns:a16="http://schemas.microsoft.com/office/drawing/2014/main" id="{4E9F3A22-2176-7297-0214-BDA9BF6E24E4}"/>
+              </a:ext>
+            </a:extLst>
+          </p:cNvPr>
+          <p:cNvPicPr>
+            <a:picLocks noChangeAspect="1" noChangeArrowheads="1"/>
+          </p:cNvPicPr>
+          <p:nvPr/>
+        </p:nvPicPr>
+        <p:blipFill>
+          <a:blip r:embed="rId2">
+            <a:extLst>
+              <a:ext uri="{28A0092B-C50C-407E-A947-70E740481C1C}">
+                <a14:useLocalDpi xmlns:a14="http://schemas.microsoft.com/office/drawing/2010/main" val="0"/>
+              </a:ext>
+            </a:extLst>
+          </a:blip>
+          <a:srcRect/>
+          <a:stretch>
+            <a:fillRect/>
+          </a:stretch>
+        </p:blipFill>
+        <p:spPr bwMode="auto">
+          <a:xfrm>
+            <a:off x="5992322" y="0"/>
+            <a:ext cx="3281680" cy="2042160"/>
+          </a:xfrm>
+          <a:prstGeom prst="rect">
+            <a:avLst/>
+          </a:prstGeom>
+          <a:noFill/>
+          <a:extLst>
+            <a:ext uri="{909E8E84-426E-40DD-AFC4-6F175D3DCCD1}">
+              <a14:hiddenFill xmlns:a14="http://schemas.microsoft.com/office/drawing/2010/main">
+                <a:solidFill>
+                  <a:srgbClr val="FFFFFF"/>
+                </a:solidFill>
+              </a14:hiddenFill>
+            </a:ext>
+          </a:extLst>
+        </p:spPr>
+      </p:pic>
+      <p:sp>
+        <p:nvSpPr>
+          <p:cNvPr id="4" name="Footer Placeholder 3">
+            <a:extLst>
+              <a:ext uri="{FF2B5EF4-FFF2-40B4-BE49-F238E27FC236}">
+                <a16:creationId xmlns:a16="http://schemas.microsoft.com/office/drawing/2014/main" id="{921D8777-D337-639F-1821-33EDCCC306A7}"/>
+              </a:ext>
+            </a:extLst>
+          </p:cNvPr>
+          <p:cNvSpPr>
+            <a:spLocks noGrp="1"/>
+          </p:cNvSpPr>
+          <p:nvPr>
+            <p:ph type="ftr" sz="quarter" idx="11"/>
+          </p:nvPr>
+        </p:nvSpPr>
+        <p:spPr/>
+        <p:txBody>
+          <a:bodyPr/>
+          <a:lstStyle/>
+          <a:p>
+            <a:r>
+              <a:rPr lang="en-US" dirty="0"/>
+              <a:t>Presenter: Saibabu Devarapalli</a:t>
+            </a:r>
+          </a:p>
+        </p:txBody>
+      </p:sp>
+      <p:sp>
+        <p:nvSpPr>
+          <p:cNvPr id="5" name="Slide Number Placeholder 4">
+            <a:extLst>
+              <a:ext uri="{FF2B5EF4-FFF2-40B4-BE49-F238E27FC236}">
+                <a16:creationId xmlns:a16="http://schemas.microsoft.com/office/drawing/2014/main" id="{55CA0B00-C037-D98E-673F-647506BF68AE}"/>
+              </a:ext>
+            </a:extLst>
+          </p:cNvPr>
+          <p:cNvSpPr>
+            <a:spLocks noGrp="1"/>
+          </p:cNvSpPr>
+          <p:nvPr>
+            <p:ph type="sldNum" sz="quarter" idx="12"/>
+          </p:nvPr>
+        </p:nvSpPr>
+        <p:spPr/>
+        <p:txBody>
+          <a:bodyPr/>
+          <a:lstStyle/>
+          <a:p>
+            <a:fld id="{B7714B7D-F657-49B8-A454-8111EBD273BB}" type="slidenum">
+              <a:rPr lang="en-US" smtClean="0"/>
+              <a:pPr/>
+              <a:t>29</a:t>
+            </a:fld>
+            <a:endParaRPr lang="en-US" dirty="0"/>
+          </a:p>
+        </p:txBody>
+      </p:sp>
+    </p:spTree>
+    <p:extLst>
+      <p:ext uri="{BB962C8B-B14F-4D97-AF65-F5344CB8AC3E}">
+        <p14:creationId xmlns:p14="http://schemas.microsoft.com/office/powerpoint/2010/main" val="2205709694"/>
+      </p:ext>
+    </p:extLst>
+  </p:cSld>
+  <p:clrMapOvr>
+    <a:masterClrMapping/>
+  </p:clrMapOvr>
+</p:sld>
+</file>
+
 <file path=ppt/slides/slide3.xml><?xml version="1.0" encoding="utf-8"?>
 <p:sld xmlns:a="http://schemas.openxmlformats.org/drawingml/2006/main" xmlns:r="http://schemas.openxmlformats.org/officeDocument/2006/relationships" xmlns:p="http://schemas.openxmlformats.org/presentationml/2006/main">
   <p:cSld>
@@ -26107,6 +26412,816 @@
     <p:extLst>
       <p:ext uri="{BB962C8B-B14F-4D97-AF65-F5344CB8AC3E}">
         <p14:creationId xmlns:p14="http://schemas.microsoft.com/office/powerpoint/2010/main" val="76866315"/>
+      </p:ext>
+    </p:extLst>
+  </p:cSld>
+  <p:clrMapOvr>
+    <a:masterClrMapping/>
+  </p:clrMapOvr>
+</p:sld>
+</file>
+
+<file path=ppt/slides/slide30.xml><?xml version="1.0" encoding="utf-8"?>
+<p:sld xmlns:a="http://schemas.openxmlformats.org/drawingml/2006/main" xmlns:r="http://schemas.openxmlformats.org/officeDocument/2006/relationships" xmlns:p="http://schemas.openxmlformats.org/presentationml/2006/main">
+  <p:cSld>
+    <p:spTree>
+      <p:nvGrpSpPr>
+        <p:cNvPr id="1" name=""/>
+        <p:cNvGrpSpPr/>
+        <p:nvPr/>
+      </p:nvGrpSpPr>
+      <p:grpSpPr>
+        <a:xfrm>
+          <a:off x="0" y="0"/>
+          <a:ext cx="0" cy="0"/>
+          <a:chOff x="0" y="0"/>
+          <a:chExt cx="0" cy="0"/>
+        </a:xfrm>
+      </p:grpSpPr>
+      <p:sp>
+        <p:nvSpPr>
+          <p:cNvPr id="2" name="Title 1">
+            <a:extLst>
+              <a:ext uri="{FF2B5EF4-FFF2-40B4-BE49-F238E27FC236}">
+                <a16:creationId xmlns:a16="http://schemas.microsoft.com/office/drawing/2014/main" id="{4FDB7A3B-0FC4-4D33-E85D-C958773341EF}"/>
+              </a:ext>
+            </a:extLst>
+          </p:cNvPr>
+          <p:cNvSpPr>
+            <a:spLocks noGrp="1"/>
+          </p:cNvSpPr>
+          <p:nvPr>
+            <p:ph type="title"/>
+          </p:nvPr>
+        </p:nvSpPr>
+        <p:spPr>
+          <a:xfrm>
+            <a:off x="677334" y="609600"/>
+            <a:ext cx="8596668" cy="828675"/>
+          </a:xfrm>
+        </p:spPr>
+        <p:txBody>
+          <a:bodyPr>
+            <a:normAutofit/>
+          </a:bodyPr>
+          <a:lstStyle/>
+          <a:p>
+            <a:r>
+              <a:rPr lang="en-US" dirty="0">
+                <a:latin typeface="Times New Roman" panose="02020603050405020304" pitchFamily="18" charset="0"/>
+                <a:cs typeface="Times New Roman" panose="02020603050405020304" pitchFamily="18" charset="0"/>
+              </a:rPr>
+              <a:t>Firebase Authentication</a:t>
+            </a:r>
+          </a:p>
+        </p:txBody>
+      </p:sp>
+      <p:sp>
+        <p:nvSpPr>
+          <p:cNvPr id="3" name="Content Placeholder 2">
+            <a:extLst>
+              <a:ext uri="{FF2B5EF4-FFF2-40B4-BE49-F238E27FC236}">
+                <a16:creationId xmlns:a16="http://schemas.microsoft.com/office/drawing/2014/main" id="{57997982-EA7F-1917-0517-CF11DE3EA469}"/>
+              </a:ext>
+            </a:extLst>
+          </p:cNvPr>
+          <p:cNvSpPr>
+            <a:spLocks noGrp="1"/>
+          </p:cNvSpPr>
+          <p:nvPr>
+            <p:ph idx="1"/>
+          </p:nvPr>
+        </p:nvSpPr>
+        <p:spPr>
+          <a:xfrm>
+            <a:off x="677334" y="1638301"/>
+            <a:ext cx="8596668" cy="4403062"/>
+          </a:xfrm>
+        </p:spPr>
+        <p:txBody>
+          <a:bodyPr>
+            <a:normAutofit/>
+          </a:bodyPr>
+          <a:lstStyle/>
+          <a:p>
+            <a:r>
+              <a:rPr lang="en-US" dirty="0">
+                <a:latin typeface="Times New Roman" panose="02020603050405020304" pitchFamily="18" charset="0"/>
+                <a:cs typeface="Times New Roman" panose="02020603050405020304" pitchFamily="18" charset="0"/>
+              </a:rPr>
+              <a:t>Reduce the function with robust authentication. </a:t>
+            </a:r>
+          </a:p>
+          <a:p>
+            <a:r>
+              <a:rPr lang="en-US" dirty="0">
+                <a:latin typeface="Times New Roman" panose="02020603050405020304" pitchFamily="18" charset="0"/>
+                <a:cs typeface="Times New Roman" panose="02020603050405020304" pitchFamily="18" charset="0"/>
+              </a:rPr>
+              <a:t>Firebase UI – provides a drop in auth solution that handles the UI flows for signing in users with email address and passwords, google sign-in and Facebook login, Git hub sign in.</a:t>
+            </a:r>
+          </a:p>
+          <a:p>
+            <a:r>
+              <a:rPr lang="en-US" dirty="0">
+                <a:latin typeface="Times New Roman" panose="02020603050405020304" pitchFamily="18" charset="0"/>
+                <a:cs typeface="Times New Roman" panose="02020603050405020304" pitchFamily="18" charset="0"/>
+              </a:rPr>
+              <a:t>E-mail &amp; Password Authentication.</a:t>
+            </a:r>
+          </a:p>
+          <a:p>
+            <a:r>
+              <a:rPr lang="en-US" dirty="0">
+                <a:latin typeface="Times New Roman" panose="02020603050405020304" pitchFamily="18" charset="0"/>
+                <a:cs typeface="Times New Roman" panose="02020603050405020304" pitchFamily="18" charset="0"/>
+              </a:rPr>
+              <a:t>Custom Auth integration.</a:t>
+            </a:r>
+          </a:p>
+          <a:p>
+            <a:r>
+              <a:rPr lang="en-US" dirty="0">
+                <a:latin typeface="Times New Roman" panose="02020603050405020304" pitchFamily="18" charset="0"/>
+                <a:cs typeface="Times New Roman" panose="02020603050405020304" pitchFamily="18" charset="0"/>
+              </a:rPr>
+              <a:t>Anonymous Auth- Use Firebase features that require authentication without requesting users to sign in in first by creating temporary anonymous accounts. If the user later choose to sign-up, you can upgrade the anonymous account to a regular account. So that user can continue where they left off.</a:t>
+            </a:r>
+          </a:p>
+          <a:p>
+            <a:r>
+              <a:rPr lang="en-US" dirty="0">
+                <a:effectLst/>
+                <a:latin typeface="Times New Roman" panose="02020603050405020304" pitchFamily="18" charset="0"/>
+                <a:ea typeface="Calibri" panose="020F0502020204030204" pitchFamily="34" charset="0"/>
+                <a:cs typeface="Times New Roman" panose="02020603050405020304" pitchFamily="18" charset="0"/>
+              </a:rPr>
+              <a:t>In additional to SDK’s firebase also provides libraries to handle lot of the tricky parts of authentication like , password recovery and email.</a:t>
+            </a:r>
+          </a:p>
+          <a:p>
+            <a:pPr marL="0" indent="0">
+              <a:buNone/>
+            </a:pPr>
+            <a:endParaRPr lang="en-US" dirty="0">
+              <a:latin typeface="Times New Roman" panose="02020603050405020304" pitchFamily="18" charset="0"/>
+              <a:cs typeface="Times New Roman" panose="02020603050405020304" pitchFamily="18" charset="0"/>
+            </a:endParaRPr>
+          </a:p>
+        </p:txBody>
+      </p:sp>
+      <p:sp>
+        <p:nvSpPr>
+          <p:cNvPr id="4" name="Footer Placeholder 3">
+            <a:extLst>
+              <a:ext uri="{FF2B5EF4-FFF2-40B4-BE49-F238E27FC236}">
+                <a16:creationId xmlns:a16="http://schemas.microsoft.com/office/drawing/2014/main" id="{52FB3013-A771-F346-211B-DBE3675DDFA4}"/>
+              </a:ext>
+            </a:extLst>
+          </p:cNvPr>
+          <p:cNvSpPr>
+            <a:spLocks noGrp="1"/>
+          </p:cNvSpPr>
+          <p:nvPr>
+            <p:ph type="ftr" sz="quarter" idx="11"/>
+          </p:nvPr>
+        </p:nvSpPr>
+        <p:spPr/>
+        <p:txBody>
+          <a:bodyPr/>
+          <a:lstStyle/>
+          <a:p>
+            <a:r>
+              <a:rPr lang="en-US" dirty="0"/>
+              <a:t>Presenter: Saibabu Devarapalli</a:t>
+            </a:r>
+          </a:p>
+        </p:txBody>
+      </p:sp>
+      <p:sp>
+        <p:nvSpPr>
+          <p:cNvPr id="5" name="Slide Number Placeholder 4">
+            <a:extLst>
+              <a:ext uri="{FF2B5EF4-FFF2-40B4-BE49-F238E27FC236}">
+                <a16:creationId xmlns:a16="http://schemas.microsoft.com/office/drawing/2014/main" id="{9F56C2AE-213E-A00F-540E-2FF986B3221B}"/>
+              </a:ext>
+            </a:extLst>
+          </p:cNvPr>
+          <p:cNvSpPr>
+            <a:spLocks noGrp="1"/>
+          </p:cNvSpPr>
+          <p:nvPr>
+            <p:ph type="sldNum" sz="quarter" idx="12"/>
+          </p:nvPr>
+        </p:nvSpPr>
+        <p:spPr/>
+        <p:txBody>
+          <a:bodyPr/>
+          <a:lstStyle/>
+          <a:p>
+            <a:fld id="{B7714B7D-F657-49B8-A454-8111EBD273BB}" type="slidenum">
+              <a:rPr lang="en-US" smtClean="0"/>
+              <a:pPr/>
+              <a:t>30</a:t>
+            </a:fld>
+            <a:endParaRPr lang="en-US" dirty="0"/>
+          </a:p>
+        </p:txBody>
+      </p:sp>
+    </p:spTree>
+    <p:extLst>
+      <p:ext uri="{BB962C8B-B14F-4D97-AF65-F5344CB8AC3E}">
+        <p14:creationId xmlns:p14="http://schemas.microsoft.com/office/powerpoint/2010/main" val="1539177117"/>
+      </p:ext>
+    </p:extLst>
+  </p:cSld>
+  <p:clrMapOvr>
+    <a:masterClrMapping/>
+  </p:clrMapOvr>
+</p:sld>
+</file>
+
+<file path=ppt/slides/slide31.xml><?xml version="1.0" encoding="utf-8"?>
+<p:sld xmlns:a="http://schemas.openxmlformats.org/drawingml/2006/main" xmlns:r="http://schemas.openxmlformats.org/officeDocument/2006/relationships" xmlns:p="http://schemas.openxmlformats.org/presentationml/2006/main">
+  <p:cSld>
+    <p:spTree>
+      <p:nvGrpSpPr>
+        <p:cNvPr id="1" name=""/>
+        <p:cNvGrpSpPr/>
+        <p:nvPr/>
+      </p:nvGrpSpPr>
+      <p:grpSpPr>
+        <a:xfrm>
+          <a:off x="0" y="0"/>
+          <a:ext cx="0" cy="0"/>
+          <a:chOff x="0" y="0"/>
+          <a:chExt cx="0" cy="0"/>
+        </a:xfrm>
+      </p:grpSpPr>
+      <p:sp>
+        <p:nvSpPr>
+          <p:cNvPr id="3" name="Content Placeholder 2">
+            <a:extLst>
+              <a:ext uri="{FF2B5EF4-FFF2-40B4-BE49-F238E27FC236}">
+                <a16:creationId xmlns:a16="http://schemas.microsoft.com/office/drawing/2014/main" id="{BB0C2F7E-7200-8CF6-0290-B3C3BEA782C1}"/>
+              </a:ext>
+            </a:extLst>
+          </p:cNvPr>
+          <p:cNvSpPr>
+            <a:spLocks noGrp="1"/>
+          </p:cNvSpPr>
+          <p:nvPr>
+            <p:ph idx="1"/>
+          </p:nvPr>
+        </p:nvSpPr>
+        <p:spPr>
+          <a:xfrm>
+            <a:off x="677334" y="238125"/>
+            <a:ext cx="8596668" cy="6486525"/>
+          </a:xfrm>
+        </p:spPr>
+        <p:txBody>
+          <a:bodyPr/>
+          <a:lstStyle/>
+          <a:p>
+            <a:endParaRPr lang="en-US" b="1" dirty="0"/>
+          </a:p>
+          <a:p>
+            <a:endParaRPr lang="en-US" b="1" dirty="0"/>
+          </a:p>
+          <a:p>
+            <a:endParaRPr lang="en-US" b="1" dirty="0"/>
+          </a:p>
+          <a:p>
+            <a:r>
+              <a:rPr lang="en-US" b="1" dirty="0">
+                <a:latin typeface="Times New Roman" panose="02020603050405020304" pitchFamily="18" charset="0"/>
+                <a:cs typeface="Times New Roman" panose="02020603050405020304" pitchFamily="18" charset="0"/>
+              </a:rPr>
+              <a:t>DATABASE</a:t>
+            </a:r>
+            <a:r>
+              <a:rPr lang="en-US" dirty="0">
+                <a:latin typeface="Times New Roman" panose="02020603050405020304" pitchFamily="18" charset="0"/>
+                <a:cs typeface="Times New Roman" panose="02020603050405020304" pitchFamily="18" charset="0"/>
+              </a:rPr>
+              <a:t> : It provides a real-time database and backend as a service. It stores and sync app data in real time. It access directly from your app.</a:t>
+            </a:r>
+          </a:p>
+          <a:p>
+            <a:r>
+              <a:rPr lang="en-US" b="1" dirty="0">
+                <a:latin typeface="Times New Roman" panose="02020603050405020304" pitchFamily="18" charset="0"/>
+                <a:cs typeface="Times New Roman" panose="02020603050405020304" pitchFamily="18" charset="0"/>
+              </a:rPr>
+              <a:t>Storage</a:t>
+            </a:r>
+            <a:r>
+              <a:rPr lang="en-US" dirty="0">
+                <a:latin typeface="Times New Roman" panose="02020603050405020304" pitchFamily="18" charset="0"/>
+                <a:cs typeface="Times New Roman" panose="02020603050405020304" pitchFamily="18" charset="0"/>
+              </a:rPr>
+              <a:t> : Stores files with ease. </a:t>
+            </a:r>
+            <a:r>
+              <a:rPr lang="en-US" sz="1800" dirty="0">
+                <a:solidFill>
+                  <a:srgbClr val="333333"/>
+                </a:solidFill>
+                <a:effectLst/>
+                <a:latin typeface="Times New Roman" panose="02020603050405020304" pitchFamily="18" charset="0"/>
+                <a:ea typeface="Calibri" panose="020F0502020204030204" pitchFamily="34" charset="0"/>
+                <a:cs typeface="Times New Roman" panose="02020603050405020304" pitchFamily="18" charset="0"/>
+              </a:rPr>
+              <a:t>Firebase is a backend -as-a-service, which allows us to store a list of objects in the form of a tree.</a:t>
+            </a:r>
+          </a:p>
+          <a:p>
+            <a:r>
+              <a:rPr lang="en-US" b="1" dirty="0">
+                <a:solidFill>
+                  <a:srgbClr val="333333"/>
+                </a:solidFill>
+                <a:latin typeface="Times New Roman" panose="02020603050405020304" pitchFamily="18" charset="0"/>
+                <a:cs typeface="Times New Roman" panose="02020603050405020304" pitchFamily="18" charset="0"/>
+              </a:rPr>
+              <a:t>Hosting</a:t>
+            </a:r>
+            <a:r>
+              <a:rPr lang="en-US" dirty="0">
+                <a:solidFill>
+                  <a:srgbClr val="333333"/>
+                </a:solidFill>
+                <a:latin typeface="Times New Roman" panose="02020603050405020304" pitchFamily="18" charset="0"/>
+                <a:cs typeface="Times New Roman" panose="02020603050405020304" pitchFamily="18" charset="0"/>
+              </a:rPr>
+              <a:t> : Deliver web content faster. </a:t>
+            </a:r>
+            <a:r>
+              <a:rPr lang="en-US" b="0" i="0" dirty="0">
+                <a:solidFill>
+                  <a:srgbClr val="202124"/>
+                </a:solidFill>
+                <a:effectLst/>
+                <a:latin typeface="Times New Roman" panose="02020603050405020304" pitchFamily="18" charset="0"/>
+                <a:cs typeface="Times New Roman" panose="02020603050405020304" pitchFamily="18" charset="0"/>
+              </a:rPr>
+              <a:t>Firebase Hosting is a fully-managed hosting service for static and dynamic content as well as microservices</a:t>
+            </a:r>
+            <a:endParaRPr lang="en-US" dirty="0">
+              <a:latin typeface="Times New Roman" panose="02020603050405020304" pitchFamily="18" charset="0"/>
+              <a:cs typeface="Times New Roman" panose="02020603050405020304" pitchFamily="18" charset="0"/>
+            </a:endParaRPr>
+          </a:p>
+          <a:p>
+            <a:r>
+              <a:rPr lang="en-US" b="1" dirty="0">
+                <a:latin typeface="Times New Roman" panose="02020603050405020304" pitchFamily="18" charset="0"/>
+                <a:cs typeface="Times New Roman" panose="02020603050405020304" pitchFamily="18" charset="0"/>
+              </a:rPr>
+              <a:t>Cloud Messaging </a:t>
+            </a:r>
+            <a:r>
+              <a:rPr lang="en-US" dirty="0">
+                <a:latin typeface="Times New Roman" panose="02020603050405020304" pitchFamily="18" charset="0"/>
+                <a:cs typeface="Times New Roman" panose="02020603050405020304" pitchFamily="18" charset="0"/>
+              </a:rPr>
+              <a:t>: Deliver and receive messages across platforms reliably.</a:t>
+            </a:r>
+          </a:p>
+          <a:p>
+            <a:r>
+              <a:rPr lang="en-US" dirty="0">
+                <a:latin typeface="Times New Roman" panose="02020603050405020304" pitchFamily="18" charset="0"/>
+                <a:cs typeface="Times New Roman" panose="02020603050405020304" pitchFamily="18" charset="0"/>
+              </a:rPr>
+              <a:t>Run a few scripts to perform actions on the Firebase database, such as writing data to it, creating Firebase references, and reading data from it. It won't be necessary to write code with extra lines.</a:t>
+            </a:r>
+          </a:p>
+          <a:p>
+            <a:r>
+              <a:rPr lang="en-US" dirty="0">
+                <a:latin typeface="Times New Roman" panose="02020603050405020304" pitchFamily="18" charset="0"/>
+                <a:cs typeface="Times New Roman" panose="02020603050405020304" pitchFamily="18" charset="0"/>
+              </a:rPr>
+              <a:t>Additionally, it will map every piece of data to a URL, When something changes, updates are pushed in milliseconds.</a:t>
+            </a:r>
+          </a:p>
+          <a:p>
+            <a:r>
+              <a:rPr lang="en-US" dirty="0">
+                <a:latin typeface="Times New Roman" panose="02020603050405020304" pitchFamily="18" charset="0"/>
+                <a:cs typeface="Times New Roman" panose="02020603050405020304" pitchFamily="18" charset="0"/>
+              </a:rPr>
+              <a:t>Security Consideration : Security rules stored and executed server side.</a:t>
+            </a:r>
+          </a:p>
+          <a:p>
+            <a:pPr marL="0" indent="0">
+              <a:buNone/>
+            </a:pPr>
+            <a:endParaRPr lang="en-US" dirty="0"/>
+          </a:p>
+          <a:p>
+            <a:pPr marL="0" indent="0">
+              <a:buNone/>
+            </a:pPr>
+            <a:endParaRPr lang="en-US" dirty="0"/>
+          </a:p>
+          <a:p>
+            <a:pPr lvl="1"/>
+            <a:endParaRPr lang="en-US" dirty="0"/>
+          </a:p>
+        </p:txBody>
+      </p:sp>
+      <p:sp>
+        <p:nvSpPr>
+          <p:cNvPr id="2" name="Title 1">
+            <a:extLst>
+              <a:ext uri="{FF2B5EF4-FFF2-40B4-BE49-F238E27FC236}">
+                <a16:creationId xmlns:a16="http://schemas.microsoft.com/office/drawing/2014/main" id="{798E3932-F090-4A50-5194-112E45F9B21F}"/>
+              </a:ext>
+            </a:extLst>
+          </p:cNvPr>
+          <p:cNvSpPr>
+            <a:spLocks noGrp="1"/>
+          </p:cNvSpPr>
+          <p:nvPr>
+            <p:ph type="title"/>
+          </p:nvPr>
+        </p:nvSpPr>
+        <p:spPr>
+          <a:xfrm>
+            <a:off x="677334" y="447675"/>
+            <a:ext cx="8596668" cy="828675"/>
+          </a:xfrm>
+        </p:spPr>
+        <p:txBody>
+          <a:bodyPr>
+            <a:normAutofit/>
+          </a:bodyPr>
+          <a:lstStyle/>
+          <a:p>
+            <a:r>
+              <a:rPr lang="en-US" dirty="0">
+                <a:latin typeface="Times New Roman" panose="02020603050405020304" pitchFamily="18" charset="0"/>
+                <a:cs typeface="Times New Roman" panose="02020603050405020304" pitchFamily="18" charset="0"/>
+              </a:rPr>
+              <a:t>Firebase Features</a:t>
+            </a:r>
+          </a:p>
+        </p:txBody>
+      </p:sp>
+      <p:sp>
+        <p:nvSpPr>
+          <p:cNvPr id="4" name="Footer Placeholder 3">
+            <a:extLst>
+              <a:ext uri="{FF2B5EF4-FFF2-40B4-BE49-F238E27FC236}">
+                <a16:creationId xmlns:a16="http://schemas.microsoft.com/office/drawing/2014/main" id="{69C7D9F2-70A5-E4B1-5663-5EF7E849A2C4}"/>
+              </a:ext>
+            </a:extLst>
+          </p:cNvPr>
+          <p:cNvSpPr>
+            <a:spLocks noGrp="1"/>
+          </p:cNvSpPr>
+          <p:nvPr>
+            <p:ph type="ftr" sz="quarter" idx="11"/>
+          </p:nvPr>
+        </p:nvSpPr>
+        <p:spPr/>
+        <p:txBody>
+          <a:bodyPr/>
+          <a:lstStyle/>
+          <a:p>
+            <a:r>
+              <a:rPr lang="en-US" dirty="0"/>
+              <a:t>Presenter: Saibabu Devarapalli</a:t>
+            </a:r>
+          </a:p>
+        </p:txBody>
+      </p:sp>
+      <p:sp>
+        <p:nvSpPr>
+          <p:cNvPr id="5" name="Slide Number Placeholder 4">
+            <a:extLst>
+              <a:ext uri="{FF2B5EF4-FFF2-40B4-BE49-F238E27FC236}">
+                <a16:creationId xmlns:a16="http://schemas.microsoft.com/office/drawing/2014/main" id="{583D5E76-728F-9A72-75B3-F4F7008B8CAD}"/>
+              </a:ext>
+            </a:extLst>
+          </p:cNvPr>
+          <p:cNvSpPr>
+            <a:spLocks noGrp="1"/>
+          </p:cNvSpPr>
+          <p:nvPr>
+            <p:ph type="sldNum" sz="quarter" idx="12"/>
+          </p:nvPr>
+        </p:nvSpPr>
+        <p:spPr/>
+        <p:txBody>
+          <a:bodyPr/>
+          <a:lstStyle/>
+          <a:p>
+            <a:fld id="{B7714B7D-F657-49B8-A454-8111EBD273BB}" type="slidenum">
+              <a:rPr lang="en-US" smtClean="0"/>
+              <a:pPr/>
+              <a:t>31</a:t>
+            </a:fld>
+            <a:endParaRPr lang="en-US" dirty="0"/>
+          </a:p>
+        </p:txBody>
+      </p:sp>
+    </p:spTree>
+    <p:extLst>
+      <p:ext uri="{BB962C8B-B14F-4D97-AF65-F5344CB8AC3E}">
+        <p14:creationId xmlns:p14="http://schemas.microsoft.com/office/powerpoint/2010/main" val="1517110941"/>
+      </p:ext>
+    </p:extLst>
+  </p:cSld>
+  <p:clrMapOvr>
+    <a:masterClrMapping/>
+  </p:clrMapOvr>
+</p:sld>
+</file>
+
+<file path=ppt/slides/slide32.xml><?xml version="1.0" encoding="utf-8"?>
+<p:sld xmlns:a="http://schemas.openxmlformats.org/drawingml/2006/main" xmlns:r="http://schemas.openxmlformats.org/officeDocument/2006/relationships" xmlns:p="http://schemas.openxmlformats.org/presentationml/2006/main">
+  <p:cSld>
+    <p:spTree>
+      <p:nvGrpSpPr>
+        <p:cNvPr id="1" name=""/>
+        <p:cNvGrpSpPr/>
+        <p:nvPr/>
+      </p:nvGrpSpPr>
+      <p:grpSpPr>
+        <a:xfrm>
+          <a:off x="0" y="0"/>
+          <a:ext cx="0" cy="0"/>
+          <a:chOff x="0" y="0"/>
+          <a:chExt cx="0" cy="0"/>
+        </a:xfrm>
+      </p:grpSpPr>
+      <p:sp>
+        <p:nvSpPr>
+          <p:cNvPr id="3" name="Content Placeholder 2">
+            <a:extLst>
+              <a:ext uri="{FF2B5EF4-FFF2-40B4-BE49-F238E27FC236}">
+                <a16:creationId xmlns:a16="http://schemas.microsoft.com/office/drawing/2014/main" id="{0654EC7B-AB4B-6257-C9F3-D09996CBEA50}"/>
+              </a:ext>
+            </a:extLst>
+          </p:cNvPr>
+          <p:cNvSpPr>
+            <a:spLocks noGrp="1"/>
+          </p:cNvSpPr>
+          <p:nvPr>
+            <p:ph idx="1"/>
+          </p:nvPr>
+        </p:nvSpPr>
+        <p:spPr>
+          <a:xfrm>
+            <a:off x="743479" y="228601"/>
+            <a:ext cx="10705042" cy="6353174"/>
+          </a:xfrm>
+        </p:spPr>
+        <p:txBody>
+          <a:bodyPr>
+            <a:normAutofit/>
+          </a:bodyPr>
+          <a:lstStyle/>
+          <a:p>
+            <a:pPr marL="0" indent="0">
+              <a:buNone/>
+            </a:pPr>
+            <a:r>
+              <a:rPr lang="en-US" b="1" dirty="0">
+                <a:latin typeface="Times New Roman" panose="02020603050405020304" pitchFamily="18" charset="0"/>
+                <a:cs typeface="Times New Roman" panose="02020603050405020304" pitchFamily="18" charset="0"/>
+              </a:rPr>
+              <a:t>Commands : </a:t>
+            </a:r>
+            <a:endParaRPr lang="en-US" dirty="0">
+              <a:latin typeface="Times New Roman" panose="02020603050405020304" pitchFamily="18" charset="0"/>
+              <a:cs typeface="Times New Roman" panose="02020603050405020304" pitchFamily="18" charset="0"/>
+            </a:endParaRPr>
+          </a:p>
+          <a:p>
+            <a:pPr marL="0" indent="0">
+              <a:buNone/>
+            </a:pPr>
+            <a:r>
+              <a:rPr lang="en-US" dirty="0">
+                <a:latin typeface="Times New Roman" panose="02020603050405020304" pitchFamily="18" charset="0"/>
+                <a:cs typeface="Times New Roman" panose="02020603050405020304" pitchFamily="18" charset="0"/>
+              </a:rPr>
+              <a:t>var ref = firebase.database().ref('/some/path'); </a:t>
+            </a:r>
+          </a:p>
+          <a:p>
+            <a:pPr marL="0" indent="0">
+              <a:buNone/>
+            </a:pPr>
+            <a:r>
+              <a:rPr lang="en-US" dirty="0">
+                <a:latin typeface="Times New Roman" panose="02020603050405020304" pitchFamily="18" charset="0"/>
+                <a:cs typeface="Times New Roman" panose="02020603050405020304" pitchFamily="18" charset="0"/>
+              </a:rPr>
+              <a:t>var obj = {someAttribute: true}; </a:t>
+            </a:r>
+          </a:p>
+          <a:p>
+            <a:pPr marL="0" indent="0">
+              <a:buNone/>
+            </a:pPr>
+            <a:r>
+              <a:rPr lang="en-US" dirty="0">
+                <a:latin typeface="Times New Roman" panose="02020603050405020304" pitchFamily="18" charset="0"/>
+                <a:cs typeface="Times New Roman" panose="02020603050405020304" pitchFamily="18" charset="0"/>
+              </a:rPr>
+              <a:t>ref.push(obj);   // Creates a new ref with a new "push key" </a:t>
+            </a:r>
+          </a:p>
+          <a:p>
+            <a:pPr marL="0" indent="0">
+              <a:buNone/>
+            </a:pPr>
+            <a:r>
+              <a:rPr lang="en-US" dirty="0">
+                <a:latin typeface="Times New Roman" panose="02020603050405020304" pitchFamily="18" charset="0"/>
+                <a:cs typeface="Times New Roman" panose="02020603050405020304" pitchFamily="18" charset="0"/>
+              </a:rPr>
+              <a:t>ref.set(obj);    // Overwrites the path , </a:t>
+            </a:r>
+          </a:p>
+          <a:p>
+            <a:pPr marL="0" indent="0">
+              <a:buNone/>
+            </a:pPr>
+            <a:r>
+              <a:rPr lang="en-US" dirty="0">
+                <a:latin typeface="Times New Roman" panose="02020603050405020304" pitchFamily="18" charset="0"/>
+                <a:cs typeface="Times New Roman" panose="02020603050405020304" pitchFamily="18" charset="0"/>
+              </a:rPr>
+              <a:t>ref.update(obj); // Updates only the specified attributes     </a:t>
+            </a:r>
+          </a:p>
+          <a:p>
+            <a:pPr marL="400050" indent="-400050">
+              <a:buFont typeface="+mj-lt"/>
+              <a:buAutoNum type="romanUcPeriod"/>
+            </a:pPr>
+            <a:r>
+              <a:rPr lang="en-US" dirty="0">
+                <a:latin typeface="Times New Roman" panose="02020603050405020304" pitchFamily="18" charset="0"/>
+                <a:cs typeface="Times New Roman" panose="02020603050405020304" pitchFamily="18" charset="0"/>
+              </a:rPr>
+              <a:t>The most straightforward way to save data is ref.set(). It overwrites the ref with whatever object you pass it.</a:t>
+            </a:r>
+          </a:p>
+          <a:p>
+            <a:pPr marL="400050" indent="-400050">
+              <a:buFont typeface="+mj-lt"/>
+              <a:buAutoNum type="romanUcPeriod"/>
+            </a:pPr>
+            <a:r>
+              <a:rPr lang="en-US" dirty="0">
+                <a:latin typeface="Times New Roman" panose="02020603050405020304" pitchFamily="18" charset="0"/>
+                <a:cs typeface="Times New Roman" panose="02020603050405020304" pitchFamily="18" charset="0"/>
+              </a:rPr>
+              <a:t>ref.push(obj) - create a new ref with an automatically generated push key.</a:t>
+            </a:r>
+          </a:p>
+          <a:p>
+            <a:pPr marL="400050" indent="-400050">
+              <a:buFont typeface="+mj-lt"/>
+              <a:buAutoNum type="romanUcPeriod"/>
+            </a:pPr>
+            <a:r>
+              <a:rPr lang="en-US" dirty="0">
+                <a:latin typeface="Times New Roman" panose="02020603050405020304" pitchFamily="18" charset="0"/>
+                <a:cs typeface="Times New Roman" panose="02020603050405020304" pitchFamily="18" charset="0"/>
+              </a:rPr>
+              <a:t>To update some keys without blowing away an entire object, use ref.update(). You could do something like userRef.update({timestamp: 123456789}); and overwrite only the timestamp attribute of userRef.</a:t>
+            </a:r>
+          </a:p>
+          <a:p>
+            <a:pPr>
+              <a:buFont typeface="Wingdings" panose="05000000000000000000" pitchFamily="2" charset="2"/>
+              <a:buChar char="§"/>
+            </a:pPr>
+            <a:r>
+              <a:rPr lang="en-US" b="0" i="0" dirty="0">
+                <a:solidFill>
+                  <a:srgbClr val="4D5156"/>
+                </a:solidFill>
+                <a:effectLst/>
+                <a:latin typeface="Times New Roman" panose="02020603050405020304" pitchFamily="18" charset="0"/>
+                <a:cs typeface="Times New Roman" panose="02020603050405020304" pitchFamily="18" charset="0"/>
+              </a:rPr>
+              <a:t>This NoSQL database makes it easy for programmers to transfer and store data for front and backend development.</a:t>
+            </a:r>
+            <a:endParaRPr lang="en-US" dirty="0">
+              <a:latin typeface="Times New Roman" panose="02020603050405020304" pitchFamily="18" charset="0"/>
+              <a:cs typeface="Times New Roman" panose="02020603050405020304" pitchFamily="18" charset="0"/>
+            </a:endParaRPr>
+          </a:p>
+          <a:p>
+            <a:pPr>
+              <a:buFont typeface="Wingdings" panose="05000000000000000000" pitchFamily="2" charset="2"/>
+              <a:buChar char="§"/>
+            </a:pPr>
+            <a:r>
+              <a:rPr lang="en-US" dirty="0">
+                <a:latin typeface="Times New Roman" panose="02020603050405020304" pitchFamily="18" charset="0"/>
+                <a:cs typeface="Times New Roman" panose="02020603050405020304" pitchFamily="18" charset="0"/>
+              </a:rPr>
+              <a:t>For Storing data and retrieving data we need to write only few lines of code.</a:t>
+            </a:r>
+          </a:p>
+          <a:p>
+            <a:pPr>
+              <a:buFont typeface="Wingdings" panose="05000000000000000000" pitchFamily="2" charset="2"/>
+              <a:buChar char="§"/>
+            </a:pPr>
+            <a:r>
+              <a:rPr lang="en-US" dirty="0">
+                <a:latin typeface="Times New Roman" panose="02020603050405020304" pitchFamily="18" charset="0"/>
+                <a:cs typeface="Times New Roman" panose="02020603050405020304" pitchFamily="18" charset="0"/>
+              </a:rPr>
+              <a:t>Because of all these features, using Firebase Database for creating applications in Android Studio is strongly advised.</a:t>
+            </a:r>
+          </a:p>
+          <a:p>
+            <a:pPr marL="0" indent="0">
+              <a:buNone/>
+            </a:pPr>
+            <a:endParaRPr lang="en-US" dirty="0">
+              <a:latin typeface="Times New Roman" panose="02020603050405020304" pitchFamily="18" charset="0"/>
+              <a:cs typeface="Times New Roman" panose="02020603050405020304" pitchFamily="18" charset="0"/>
+            </a:endParaRPr>
+          </a:p>
+        </p:txBody>
+      </p:sp>
+      <p:sp>
+        <p:nvSpPr>
+          <p:cNvPr id="2" name="Footer Placeholder 1">
+            <a:extLst>
+              <a:ext uri="{FF2B5EF4-FFF2-40B4-BE49-F238E27FC236}">
+                <a16:creationId xmlns:a16="http://schemas.microsoft.com/office/drawing/2014/main" id="{403B1481-3BD4-6FD1-0582-BA921D59C18A}"/>
+              </a:ext>
+            </a:extLst>
+          </p:cNvPr>
+          <p:cNvSpPr>
+            <a:spLocks noGrp="1"/>
+          </p:cNvSpPr>
+          <p:nvPr>
+            <p:ph type="ftr" sz="quarter" idx="11"/>
+          </p:nvPr>
+        </p:nvSpPr>
+        <p:spPr/>
+        <p:txBody>
+          <a:bodyPr/>
+          <a:lstStyle/>
+          <a:p>
+            <a:r>
+              <a:rPr lang="en-US" dirty="0"/>
+              <a:t>Presenter: Saibabu Devarapalli</a:t>
+            </a:r>
+          </a:p>
+        </p:txBody>
+      </p:sp>
+      <p:sp>
+        <p:nvSpPr>
+          <p:cNvPr id="4" name="Slide Number Placeholder 3">
+            <a:extLst>
+              <a:ext uri="{FF2B5EF4-FFF2-40B4-BE49-F238E27FC236}">
+                <a16:creationId xmlns:a16="http://schemas.microsoft.com/office/drawing/2014/main" id="{D37CB3A9-5FB0-8474-8BEC-227C65D46273}"/>
+              </a:ext>
+            </a:extLst>
+          </p:cNvPr>
+          <p:cNvSpPr>
+            <a:spLocks noGrp="1"/>
+          </p:cNvSpPr>
+          <p:nvPr>
+            <p:ph type="sldNum" sz="quarter" idx="12"/>
+          </p:nvPr>
+        </p:nvSpPr>
+        <p:spPr/>
+        <p:txBody>
+          <a:bodyPr/>
+          <a:lstStyle/>
+          <a:p>
+            <a:fld id="{B7714B7D-F657-49B8-A454-8111EBD273BB}" type="slidenum">
+              <a:rPr lang="en-US" smtClean="0"/>
+              <a:pPr/>
+              <a:t>32</a:t>
+            </a:fld>
+            <a:endParaRPr lang="en-US" dirty="0"/>
+          </a:p>
+        </p:txBody>
+      </p:sp>
+    </p:spTree>
+    <p:extLst>
+      <p:ext uri="{BB962C8B-B14F-4D97-AF65-F5344CB8AC3E}">
+        <p14:creationId xmlns:p14="http://schemas.microsoft.com/office/powerpoint/2010/main" val="2253980586"/>
       </p:ext>
     </p:extLst>
   </p:cSld>

</xml_diff>